<commit_message>
finished all character designs
</commit_message>
<xml_diff>
--- a/heroes-with-capes/docs/Heroes with Capes.pptx
+++ b/heroes-with-capes/docs/Heroes with Capes.pptx
@@ -17,6 +17,9 @@
     <p:sldId id="263" r:id="rId11"/>
     <p:sldId id="266" r:id="rId12"/>
     <p:sldId id="267" r:id="rId13"/>
+    <p:sldId id="268" r:id="rId14"/>
+    <p:sldId id="269" r:id="rId15"/>
+    <p:sldId id="270" r:id="rId16"/>
   </p:sldIdLst>
   <p:sldSz cx="12192000" cy="6858000"/>
   <p:notesSz cx="6858000" cy="9144000"/>
@@ -270,7 +273,7 @@
           <a:p>
             <a:fld id="{66B2457F-A2F2-40AB-B7AA-8F2CD9037FA0}" type="datetimeFigureOut">
               <a:rPr lang="en-US" smtClean="0"/>
-              <a:t>4/7/2020</a:t>
+              <a:t>4/10/20</a:t>
             </a:fld>
             <a:endParaRPr lang="en-US"/>
           </a:p>
@@ -468,7 +471,7 @@
           <a:p>
             <a:fld id="{66B2457F-A2F2-40AB-B7AA-8F2CD9037FA0}" type="datetimeFigureOut">
               <a:rPr lang="en-US" smtClean="0"/>
-              <a:t>4/7/2020</a:t>
+              <a:t>4/10/20</a:t>
             </a:fld>
             <a:endParaRPr lang="en-US"/>
           </a:p>
@@ -676,7 +679,7 @@
           <a:p>
             <a:fld id="{66B2457F-A2F2-40AB-B7AA-8F2CD9037FA0}" type="datetimeFigureOut">
               <a:rPr lang="en-US" smtClean="0"/>
-              <a:t>4/7/2020</a:t>
+              <a:t>4/10/20</a:t>
             </a:fld>
             <a:endParaRPr lang="en-US"/>
           </a:p>
@@ -874,7 +877,7 @@
           <a:p>
             <a:fld id="{66B2457F-A2F2-40AB-B7AA-8F2CD9037FA0}" type="datetimeFigureOut">
               <a:rPr lang="en-US" smtClean="0"/>
-              <a:t>4/7/2020</a:t>
+              <a:t>4/10/20</a:t>
             </a:fld>
             <a:endParaRPr lang="en-US"/>
           </a:p>
@@ -1149,7 +1152,7 @@
           <a:p>
             <a:fld id="{66B2457F-A2F2-40AB-B7AA-8F2CD9037FA0}" type="datetimeFigureOut">
               <a:rPr lang="en-US" smtClean="0"/>
-              <a:t>4/7/2020</a:t>
+              <a:t>4/10/20</a:t>
             </a:fld>
             <a:endParaRPr lang="en-US"/>
           </a:p>
@@ -1414,7 +1417,7 @@
           <a:p>
             <a:fld id="{66B2457F-A2F2-40AB-B7AA-8F2CD9037FA0}" type="datetimeFigureOut">
               <a:rPr lang="en-US" smtClean="0"/>
-              <a:t>4/7/2020</a:t>
+              <a:t>4/10/20</a:t>
             </a:fld>
             <a:endParaRPr lang="en-US"/>
           </a:p>
@@ -1826,7 +1829,7 @@
           <a:p>
             <a:fld id="{66B2457F-A2F2-40AB-B7AA-8F2CD9037FA0}" type="datetimeFigureOut">
               <a:rPr lang="en-US" smtClean="0"/>
-              <a:t>4/7/2020</a:t>
+              <a:t>4/10/20</a:t>
             </a:fld>
             <a:endParaRPr lang="en-US"/>
           </a:p>
@@ -1967,7 +1970,7 @@
           <a:p>
             <a:fld id="{66B2457F-A2F2-40AB-B7AA-8F2CD9037FA0}" type="datetimeFigureOut">
               <a:rPr lang="en-US" smtClean="0"/>
-              <a:t>4/7/2020</a:t>
+              <a:t>4/10/20</a:t>
             </a:fld>
             <a:endParaRPr lang="en-US"/>
           </a:p>
@@ -2080,7 +2083,7 @@
           <a:p>
             <a:fld id="{66B2457F-A2F2-40AB-B7AA-8F2CD9037FA0}" type="datetimeFigureOut">
               <a:rPr lang="en-US" smtClean="0"/>
-              <a:t>4/7/2020</a:t>
+              <a:t>4/10/20</a:t>
             </a:fld>
             <a:endParaRPr lang="en-US"/>
           </a:p>
@@ -2391,7 +2394,7 @@
           <a:p>
             <a:fld id="{66B2457F-A2F2-40AB-B7AA-8F2CD9037FA0}" type="datetimeFigureOut">
               <a:rPr lang="en-US" smtClean="0"/>
-              <a:t>4/7/2020</a:t>
+              <a:t>4/10/20</a:t>
             </a:fld>
             <a:endParaRPr lang="en-US"/>
           </a:p>
@@ -2679,7 +2682,7 @@
           <a:p>
             <a:fld id="{66B2457F-A2F2-40AB-B7AA-8F2CD9037FA0}" type="datetimeFigureOut">
               <a:rPr lang="en-US" smtClean="0"/>
-              <a:t>4/7/2020</a:t>
+              <a:t>4/10/20</a:t>
             </a:fld>
             <a:endParaRPr lang="en-US"/>
           </a:p>
@@ -2920,7 +2923,7 @@
           <a:p>
             <a:fld id="{66B2457F-A2F2-40AB-B7AA-8F2CD9037FA0}" type="datetimeFigureOut">
               <a:rPr lang="en-US" smtClean="0"/>
-              <a:t>4/7/2020</a:t>
+              <a:t>4/10/20</a:t>
             </a:fld>
             <a:endParaRPr lang="en-US"/>
           </a:p>
@@ -3756,6 +3759,396 @@
     <p:extLst>
       <p:ext uri="{BB962C8B-B14F-4D97-AF65-F5344CB8AC3E}">
         <p14:creationId xmlns:p14="http://schemas.microsoft.com/office/powerpoint/2010/main" val="3486084565"/>
+      </p:ext>
+    </p:extLst>
+  </p:cSld>
+  <p:clrMapOvr>
+    <a:masterClrMapping/>
+  </p:clrMapOvr>
+</p:sld>
+</file>
+
+<file path=ppt/slides/slide13.xml><?xml version="1.0" encoding="utf-8"?>
+<p:sld xmlns:a="http://schemas.openxmlformats.org/drawingml/2006/main" xmlns:r="http://schemas.openxmlformats.org/officeDocument/2006/relationships" xmlns:p="http://schemas.openxmlformats.org/presentationml/2006/main">
+  <p:cSld>
+    <p:spTree>
+      <p:nvGrpSpPr>
+        <p:cNvPr id="1" name=""/>
+        <p:cNvGrpSpPr/>
+        <p:nvPr/>
+      </p:nvGrpSpPr>
+      <p:grpSpPr>
+        <a:xfrm>
+          <a:off x="0" y="0"/>
+          <a:ext cx="0" cy="0"/>
+          <a:chOff x="0" y="0"/>
+          <a:chExt cx="0" cy="0"/>
+        </a:xfrm>
+      </p:grpSpPr>
+      <p:sp>
+        <p:nvSpPr>
+          <p:cNvPr id="2" name="Title 1">
+            <a:extLst>
+              <a:ext uri="{FF2B5EF4-FFF2-40B4-BE49-F238E27FC236}">
+                <a16:creationId xmlns:a16="http://schemas.microsoft.com/office/drawing/2014/main" id="{5E2E8812-DD6C-3348-A41F-AB4192BA43F7}"/>
+              </a:ext>
+            </a:extLst>
+          </p:cNvPr>
+          <p:cNvSpPr>
+            <a:spLocks noGrp="1"/>
+          </p:cNvSpPr>
+          <p:nvPr>
+            <p:ph type="title"/>
+          </p:nvPr>
+        </p:nvSpPr>
+        <p:spPr/>
+        <p:txBody>
+          <a:bodyPr/>
+          <a:lstStyle/>
+          <a:p>
+            <a:r>
+              <a:rPr lang="en-US" dirty="0"/>
+              <a:t>Green</a:t>
+            </a:r>
+          </a:p>
+        </p:txBody>
+      </p:sp>
+      <p:pic>
+        <p:nvPicPr>
+          <p:cNvPr id="4" name="Picture 3" descr="A close up of a flower&#10;&#10;Description automatically generated">
+            <a:extLst>
+              <a:ext uri="{FF2B5EF4-FFF2-40B4-BE49-F238E27FC236}">
+                <a16:creationId xmlns:a16="http://schemas.microsoft.com/office/drawing/2014/main" id="{7A9D95A7-38BB-C04F-A54C-AC38DCFEB136}"/>
+              </a:ext>
+            </a:extLst>
+          </p:cNvPr>
+          <p:cNvPicPr>
+            <a:picLocks noChangeAspect="1"/>
+          </p:cNvPicPr>
+          <p:nvPr/>
+        </p:nvPicPr>
+        <p:blipFill>
+          <a:blip r:embed="rId2">
+            <a:extLst>
+              <a:ext uri="{28A0092B-C50C-407E-A947-70E740481C1C}">
+                <a14:useLocalDpi xmlns:a14="http://schemas.microsoft.com/office/drawing/2010/main" val="0"/>
+              </a:ext>
+            </a:extLst>
+          </a:blip>
+          <a:stretch>
+            <a:fillRect/>
+          </a:stretch>
+        </p:blipFill>
+        <p:spPr>
+          <a:xfrm>
+            <a:off x="3683584" y="1514731"/>
+            <a:ext cx="3820058" cy="4667901"/>
+          </a:xfrm>
+          <a:prstGeom prst="rect">
+            <a:avLst/>
+          </a:prstGeom>
+        </p:spPr>
+      </p:pic>
+      <p:pic>
+        <p:nvPicPr>
+          <p:cNvPr id="5" name="Picture 4" descr="A picture containing drawing&#10;&#10;Description automatically generated">
+            <a:extLst>
+              <a:ext uri="{FF2B5EF4-FFF2-40B4-BE49-F238E27FC236}">
+                <a16:creationId xmlns:a16="http://schemas.microsoft.com/office/drawing/2014/main" id="{C6206E41-F0B8-DE48-9AAD-3FD69FD548FC}"/>
+              </a:ext>
+            </a:extLst>
+          </p:cNvPr>
+          <p:cNvPicPr>
+            <a:picLocks noChangeAspect="1"/>
+          </p:cNvPicPr>
+          <p:nvPr/>
+        </p:nvPicPr>
+        <p:blipFill>
+          <a:blip r:embed="rId3">
+            <a:extLst>
+              <a:ext uri="{28A0092B-C50C-407E-A947-70E740481C1C}">
+                <a14:useLocalDpi xmlns:a14="http://schemas.microsoft.com/office/drawing/2010/main" val="0"/>
+              </a:ext>
+            </a:extLst>
+          </a:blip>
+          <a:stretch>
+            <a:fillRect/>
+          </a:stretch>
+        </p:blipFill>
+        <p:spPr>
+          <a:xfrm>
+            <a:off x="0" y="1514731"/>
+            <a:ext cx="3653484" cy="5037876"/>
+          </a:xfrm>
+          <a:prstGeom prst="rect">
+            <a:avLst/>
+          </a:prstGeom>
+        </p:spPr>
+      </p:pic>
+    </p:spTree>
+    <p:extLst>
+      <p:ext uri="{BB962C8B-B14F-4D97-AF65-F5344CB8AC3E}">
+        <p14:creationId xmlns:p14="http://schemas.microsoft.com/office/powerpoint/2010/main" val="1777073801"/>
+      </p:ext>
+    </p:extLst>
+  </p:cSld>
+  <p:clrMapOvr>
+    <a:masterClrMapping/>
+  </p:clrMapOvr>
+</p:sld>
+</file>
+
+<file path=ppt/slides/slide14.xml><?xml version="1.0" encoding="utf-8"?>
+<p:sld xmlns:a="http://schemas.openxmlformats.org/drawingml/2006/main" xmlns:r="http://schemas.openxmlformats.org/officeDocument/2006/relationships" xmlns:p="http://schemas.openxmlformats.org/presentationml/2006/main">
+  <p:cSld>
+    <p:spTree>
+      <p:nvGrpSpPr>
+        <p:cNvPr id="1" name=""/>
+        <p:cNvGrpSpPr/>
+        <p:nvPr/>
+      </p:nvGrpSpPr>
+      <p:grpSpPr>
+        <a:xfrm>
+          <a:off x="0" y="0"/>
+          <a:ext cx="0" cy="0"/>
+          <a:chOff x="0" y="0"/>
+          <a:chExt cx="0" cy="0"/>
+        </a:xfrm>
+      </p:grpSpPr>
+      <p:sp>
+        <p:nvSpPr>
+          <p:cNvPr id="2" name="Title 1">
+            <a:extLst>
+              <a:ext uri="{FF2B5EF4-FFF2-40B4-BE49-F238E27FC236}">
+                <a16:creationId xmlns:a16="http://schemas.microsoft.com/office/drawing/2014/main" id="{6935E3FD-146A-0D46-99A8-B11E4A3B6AFD}"/>
+              </a:ext>
+            </a:extLst>
+          </p:cNvPr>
+          <p:cNvSpPr>
+            <a:spLocks noGrp="1"/>
+          </p:cNvSpPr>
+          <p:nvPr>
+            <p:ph type="title"/>
+          </p:nvPr>
+        </p:nvSpPr>
+        <p:spPr/>
+        <p:txBody>
+          <a:bodyPr/>
+          <a:lstStyle/>
+          <a:p>
+            <a:r>
+              <a:rPr lang="en-US" dirty="0"/>
+              <a:t>Red</a:t>
+            </a:r>
+          </a:p>
+        </p:txBody>
+      </p:sp>
+      <p:pic>
+        <p:nvPicPr>
+          <p:cNvPr id="4" name="Picture 3" descr="A picture containing photo, food, cup, items&#10;&#10;Description automatically generated">
+            <a:extLst>
+              <a:ext uri="{FF2B5EF4-FFF2-40B4-BE49-F238E27FC236}">
+                <a16:creationId xmlns:a16="http://schemas.microsoft.com/office/drawing/2014/main" id="{A51F20E5-FA53-F242-BC93-FBF50E6B552D}"/>
+              </a:ext>
+            </a:extLst>
+          </p:cNvPr>
+          <p:cNvPicPr>
+            <a:picLocks noChangeAspect="1"/>
+          </p:cNvPicPr>
+          <p:nvPr/>
+        </p:nvPicPr>
+        <p:blipFill>
+          <a:blip r:embed="rId2">
+            <a:extLst>
+              <a:ext uri="{28A0092B-C50C-407E-A947-70E740481C1C}">
+                <a14:useLocalDpi xmlns:a14="http://schemas.microsoft.com/office/drawing/2010/main" val="0"/>
+              </a:ext>
+            </a:extLst>
+          </a:blip>
+          <a:stretch>
+            <a:fillRect/>
+          </a:stretch>
+        </p:blipFill>
+        <p:spPr>
+          <a:xfrm>
+            <a:off x="3460009" y="1784317"/>
+            <a:ext cx="4198552" cy="5073683"/>
+          </a:xfrm>
+          <a:prstGeom prst="rect">
+            <a:avLst/>
+          </a:prstGeom>
+        </p:spPr>
+      </p:pic>
+      <p:pic>
+        <p:nvPicPr>
+          <p:cNvPr id="5" name="Picture 4" descr="A drawing of a person&#10;&#10;Description automatically generated">
+            <a:extLst>
+              <a:ext uri="{FF2B5EF4-FFF2-40B4-BE49-F238E27FC236}">
+                <a16:creationId xmlns:a16="http://schemas.microsoft.com/office/drawing/2014/main" id="{EDC866A1-3ECE-5241-911E-3C14C8979CB3}"/>
+              </a:ext>
+            </a:extLst>
+          </p:cNvPr>
+          <p:cNvPicPr>
+            <a:picLocks noChangeAspect="1"/>
+          </p:cNvPicPr>
+          <p:nvPr/>
+        </p:nvPicPr>
+        <p:blipFill>
+          <a:blip r:embed="rId3">
+            <a:extLst>
+              <a:ext uri="{28A0092B-C50C-407E-A947-70E740481C1C}">
+                <a14:useLocalDpi xmlns:a14="http://schemas.microsoft.com/office/drawing/2010/main" val="0"/>
+              </a:ext>
+            </a:extLst>
+          </a:blip>
+          <a:stretch>
+            <a:fillRect/>
+          </a:stretch>
+        </p:blipFill>
+        <p:spPr>
+          <a:xfrm>
+            <a:off x="0" y="1690688"/>
+            <a:ext cx="3460009" cy="5048209"/>
+          </a:xfrm>
+          <a:prstGeom prst="rect">
+            <a:avLst/>
+          </a:prstGeom>
+        </p:spPr>
+      </p:pic>
+    </p:spTree>
+    <p:extLst>
+      <p:ext uri="{BB962C8B-B14F-4D97-AF65-F5344CB8AC3E}">
+        <p14:creationId xmlns:p14="http://schemas.microsoft.com/office/powerpoint/2010/main" val="2551933035"/>
+      </p:ext>
+    </p:extLst>
+  </p:cSld>
+  <p:clrMapOvr>
+    <a:masterClrMapping/>
+  </p:clrMapOvr>
+</p:sld>
+</file>
+
+<file path=ppt/slides/slide15.xml><?xml version="1.0" encoding="utf-8"?>
+<p:sld xmlns:a="http://schemas.openxmlformats.org/drawingml/2006/main" xmlns:r="http://schemas.openxmlformats.org/officeDocument/2006/relationships" xmlns:p="http://schemas.openxmlformats.org/presentationml/2006/main">
+  <p:cSld>
+    <p:spTree>
+      <p:nvGrpSpPr>
+        <p:cNvPr id="1" name=""/>
+        <p:cNvGrpSpPr/>
+        <p:nvPr/>
+      </p:nvGrpSpPr>
+      <p:grpSpPr>
+        <a:xfrm>
+          <a:off x="0" y="0"/>
+          <a:ext cx="0" cy="0"/>
+          <a:chOff x="0" y="0"/>
+          <a:chExt cx="0" cy="0"/>
+        </a:xfrm>
+      </p:grpSpPr>
+      <p:sp>
+        <p:nvSpPr>
+          <p:cNvPr id="2" name="Title 1">
+            <a:extLst>
+              <a:ext uri="{FF2B5EF4-FFF2-40B4-BE49-F238E27FC236}">
+                <a16:creationId xmlns:a16="http://schemas.microsoft.com/office/drawing/2014/main" id="{08F1B476-1A22-5D45-A548-B3A1E2434D49}"/>
+              </a:ext>
+            </a:extLst>
+          </p:cNvPr>
+          <p:cNvSpPr>
+            <a:spLocks noGrp="1"/>
+          </p:cNvSpPr>
+          <p:nvPr>
+            <p:ph type="title"/>
+          </p:nvPr>
+        </p:nvSpPr>
+        <p:spPr/>
+        <p:txBody>
+          <a:bodyPr/>
+          <a:lstStyle/>
+          <a:p>
+            <a:r>
+              <a:rPr lang="en-US" dirty="0"/>
+              <a:t>Blue</a:t>
+            </a:r>
+          </a:p>
+        </p:txBody>
+      </p:sp>
+      <p:pic>
+        <p:nvPicPr>
+          <p:cNvPr id="4" name="Picture 3" descr="A picture containing fruit, covered, snow, board&#10;&#10;Description automatically generated">
+            <a:extLst>
+              <a:ext uri="{FF2B5EF4-FFF2-40B4-BE49-F238E27FC236}">
+                <a16:creationId xmlns:a16="http://schemas.microsoft.com/office/drawing/2014/main" id="{9D11D733-77A6-CF4F-884B-7B67828BF5DB}"/>
+              </a:ext>
+            </a:extLst>
+          </p:cNvPr>
+          <p:cNvPicPr>
+            <a:picLocks noChangeAspect="1"/>
+          </p:cNvPicPr>
+          <p:nvPr/>
+        </p:nvPicPr>
+        <p:blipFill>
+          <a:blip r:embed="rId2">
+            <a:extLst>
+              <a:ext uri="{28A0092B-C50C-407E-A947-70E740481C1C}">
+                <a14:useLocalDpi xmlns:a14="http://schemas.microsoft.com/office/drawing/2010/main" val="0"/>
+              </a:ext>
+            </a:extLst>
+          </a:blip>
+          <a:stretch>
+            <a:fillRect/>
+          </a:stretch>
+        </p:blipFill>
+        <p:spPr>
+          <a:xfrm>
+            <a:off x="3399875" y="2086167"/>
+            <a:ext cx="3829584" cy="4639322"/>
+          </a:xfrm>
+          <a:prstGeom prst="rect">
+            <a:avLst/>
+          </a:prstGeom>
+        </p:spPr>
+      </p:pic>
+      <p:pic>
+        <p:nvPicPr>
+          <p:cNvPr id="5" name="Picture 4" descr="A picture containing text, drawing&#10;&#10;Description automatically generated">
+            <a:extLst>
+              <a:ext uri="{FF2B5EF4-FFF2-40B4-BE49-F238E27FC236}">
+                <a16:creationId xmlns:a16="http://schemas.microsoft.com/office/drawing/2014/main" id="{D13CD79A-2067-4449-8B88-0469EFB27837}"/>
+              </a:ext>
+            </a:extLst>
+          </p:cNvPr>
+          <p:cNvPicPr>
+            <a:picLocks noChangeAspect="1"/>
+          </p:cNvPicPr>
+          <p:nvPr/>
+        </p:nvPicPr>
+        <p:blipFill>
+          <a:blip r:embed="rId3">
+            <a:extLst>
+              <a:ext uri="{28A0092B-C50C-407E-A947-70E740481C1C}">
+                <a14:useLocalDpi xmlns:a14="http://schemas.microsoft.com/office/drawing/2010/main" val="0"/>
+              </a:ext>
+            </a:extLst>
+          </a:blip>
+          <a:stretch>
+            <a:fillRect/>
+          </a:stretch>
+        </p:blipFill>
+        <p:spPr>
+          <a:xfrm>
+            <a:off x="0" y="1686245"/>
+            <a:ext cx="3399875" cy="5039244"/>
+          </a:xfrm>
+          <a:prstGeom prst="rect">
+            <a:avLst/>
+          </a:prstGeom>
+        </p:spPr>
+      </p:pic>
+    </p:spTree>
+    <p:extLst>
+      <p:ext uri="{BB962C8B-B14F-4D97-AF65-F5344CB8AC3E}">
+        <p14:creationId xmlns:p14="http://schemas.microsoft.com/office/powerpoint/2010/main" val="1752288191"/>
       </p:ext>
     </p:extLst>
   </p:cSld>

</xml_diff>